<commit_message>
Fixed some of my slides to fit time
</commit_message>
<xml_diff>
--- a/IntroSWEng.FinalPresentations.pptx
+++ b/IntroSWEng.FinalPresentations.pptx
@@ -12566,13 +12566,10 @@
               <a:t> </a:t>
             </a:r>
             <a:r>
-              <a:rPr lang="es-ES" dirty="0" err="1"/>
-              <a:t>for</a:t>
-            </a:r>
-            <a:r>
-              <a:rPr lang="es-ES" dirty="0"/>
-              <a:t>:</a:t>
-            </a:r>
+              <a:rPr lang="es-ES"/>
+              <a:t>to:</a:t>
+            </a:r>
+            <a:endParaRPr lang="es-ES" dirty="0"/>
           </a:p>
           <a:p>
             <a:pPr lvl="2"/>
@@ -13065,35 +13062,24 @@
             </a:r>
           </a:p>
           <a:p>
-            <a:pPr lvl="1">
-              <a:lnSpc>
-                <a:spcPct val="90000"/>
-              </a:lnSpc>
-            </a:pPr>
-            <a:r>
-              <a:rPr lang="es-ES" sz="2500" dirty="0" err="1">
-                <a:solidFill>
-                  <a:schemeClr val="tx1"/>
-                </a:solidFill>
-              </a:rPr>
-              <a:t>Frequency</a:t>
-            </a:r>
-            <a:endParaRPr lang="es-ES" sz="2500" dirty="0">
-              <a:solidFill>
-                <a:schemeClr val="tx1"/>
-              </a:solidFill>
-            </a:endParaRPr>
-          </a:p>
-          <a:p>
             <a:pPr>
               <a:lnSpc>
                 <a:spcPct val="90000"/>
               </a:lnSpc>
             </a:pPr>
             <a:r>
+              <a:rPr lang="es-ES" dirty="0" err="1"/>
+              <a:t>Accountability</a:t>
+            </a:r>
+            <a:r>
               <a:rPr lang="es-ES" dirty="0"/>
-              <a:t>Accountability system</a:t>
-            </a:r>
+              <a:t> </a:t>
+            </a:r>
+            <a:r>
+              <a:rPr lang="es-ES" dirty="0" err="1"/>
+              <a:t>system</a:t>
+            </a:r>
+            <a:endParaRPr lang="es-ES" dirty="0"/>
           </a:p>
           <a:p>
             <a:pPr lvl="1">
@@ -13203,21 +13189,6 @@
                 </a:solidFill>
               </a:rPr>
               <a:t>GitHub</a:t>
-            </a:r>
-          </a:p>
-          <a:p>
-            <a:pPr lvl="1">
-              <a:lnSpc>
-                <a:spcPct val="90000"/>
-              </a:lnSpc>
-            </a:pPr>
-            <a:r>
-              <a:rPr lang="es-ES" sz="2500" dirty="0">
-                <a:solidFill>
-                  <a:schemeClr val="tx1"/>
-                </a:solidFill>
-              </a:rPr>
-              <a:t>WhatsApp</a:t>
             </a:r>
           </a:p>
         </p:txBody>

</xml_diff>